<commit_message>
added coeficients preparation for LS, GD, LogisticRegression
</commit_message>
<xml_diff>
--- a/Algoritmi ML de predictie a sansei de ploaie.pptx
+++ b/Algoritmi ML de predictie a sansei de ploaie.pptx
@@ -16,6 +16,10 @@
     <p:sldId id="317" r:id="rId13"/>
     <p:sldId id="318" r:id="rId14"/>
     <p:sldId id="319" r:id="rId15"/>
+    <p:sldId id="320" r:id="rId16"/>
+    <p:sldId id="321" r:id="rId17"/>
+    <p:sldId id="322" r:id="rId18"/>
+    <p:sldId id="323" r:id="rId19"/>
   </p:sldIdLst>
   <p:sldSz cx="12192000" cy="6858000"/>
   <p:notesSz cx="6858000" cy="9144000"/>
@@ -116,10 +120,47 @@
   </p:defaultTextStyle>
   <p:extLst>
     <p:ext uri="{EFAFB233-063F-42B5-8137-9DF3F51BA10A}">
-      <p15:sldGuideLst xmlns="" xmlns:p15="http://schemas.microsoft.com/office/powerpoint/2012/main"/>
+      <p15:sldGuideLst xmlns:p15="http://schemas.microsoft.com/office/powerpoint/2012/main">
+        <p15:guide id="1" orient="horz" pos="2160">
+          <p15:clr>
+            <a:srgbClr val="A4A3A4"/>
+          </p15:clr>
+        </p15:guide>
+        <p15:guide id="2" pos="3840">
+          <p15:clr>
+            <a:srgbClr val="A4A3A4"/>
+          </p15:clr>
+        </p15:guide>
+      </p15:sldGuideLst>
     </p:ext>
   </p:extLst>
 </p:presentation>
+</file>
+
+<file path=ppt/commentAuthors.xml><?xml version="1.0" encoding="utf-8"?>
+<p:cmAuthorLst xmlns:a="http://schemas.openxmlformats.org/drawingml/2006/main" xmlns:r="http://schemas.openxmlformats.org/officeDocument/2006/relationships" xmlns:p="http://schemas.openxmlformats.org/presentationml/2006/main">
+  <p:cmAuthor id="1" name="Alexandru-Mihai Sabou" initials="AS" lastIdx="1" clrIdx="0">
+    <p:extLst>
+      <p:ext uri="{19B8F6BF-5375-455C-9EA6-DF929625EA0E}">
+        <p15:presenceInfo xmlns:p15="http://schemas.microsoft.com/office/powerpoint/2012/main" userId="S::alexandru.sabou@fortech.ro::8d43dea7-1c75-4599-8bd1-8053ae7b1f1b" providerId="AD"/>
+      </p:ext>
+    </p:extLst>
+  </p:cmAuthor>
+</p:cmAuthorLst>
+</file>
+
+<file path=ppt/comments/comment1.xml><?xml version="1.0" encoding="utf-8"?>
+<p:cmLst xmlns:a="http://schemas.openxmlformats.org/drawingml/2006/main" xmlns:r="http://schemas.openxmlformats.org/officeDocument/2006/relationships" xmlns:p="http://schemas.openxmlformats.org/presentationml/2006/main">
+  <p:cm authorId="1" dt="2022-01-11T14:16:23.800" idx="1">
+    <p:pos x="10" y="10"/>
+    <p:text/>
+    <p:extLst>
+      <p:ext uri="{C676402C-5697-4E1C-873F-D02D1690AC5C}">
+        <p15:threadingInfo xmlns:p15="http://schemas.microsoft.com/office/powerpoint/2012/main" timeZoneBias="-120"/>
+      </p:ext>
+    </p:extLst>
+  </p:cm>
+</p:cmLst>
 </file>
 
 <file path=ppt/slideLayouts/slideLayout1.xml><?xml version="1.0" encoding="utf-8"?>
@@ -144,7 +185,7 @@
           <p:cNvPr id="5" name="Rectangle 4">
             <a:extLst>
               <a:ext uri="{FF2B5EF4-FFF2-40B4-BE49-F238E27FC236}">
-                <a16:creationId xmlns="" xmlns:a16="http://schemas.microsoft.com/office/drawing/2014/main" id="{904DB13E-F722-4ED6-BB00-556651E95281}"/>
+                <a16:creationId xmlns:a16="http://schemas.microsoft.com/office/drawing/2014/main" id="{904DB13E-F722-4ED6-BB00-556651E95281}"/>
               </a:ext>
             </a:extLst>
           </p:cNvPr>
@@ -293,7 +334,7 @@
           <p:cNvPr id="7" name="Group 6">
             <a:extLst>
               <a:ext uri="{FF2B5EF4-FFF2-40B4-BE49-F238E27FC236}">
-                <a16:creationId xmlns="" xmlns:a16="http://schemas.microsoft.com/office/drawing/2014/main" id="{E26428D7-C6F3-473D-A360-A3F5C3E8728C}"/>
+                <a16:creationId xmlns:a16="http://schemas.microsoft.com/office/drawing/2014/main" id="{E26428D7-C6F3-473D-A360-A3F5C3E8728C}"/>
               </a:ext>
             </a:extLst>
           </p:cNvPr>
@@ -592,7 +633,7 @@
             <a:fld id="{EA0C0817-A112-4847-8014-A94B7D2A4EA3}" type="datetime1">
               <a:rPr lang="en-US" smtClean="0"/>
               <a:pPr/>
-              <a:t>1/10/2022</a:t>
+              <a:t>11-Jan-22</a:t>
             </a:fld>
             <a:endParaRPr lang="en-US" dirty="0"/>
           </a:p>
@@ -676,7 +717,7 @@
     </p:spTree>
     <p:extLst>
       <p:ext uri="{BB962C8B-B14F-4D97-AF65-F5344CB8AC3E}">
-        <p14:creationId xmlns="" xmlns:p14="http://schemas.microsoft.com/office/powerpoint/2010/main" val="3957750197"/>
+        <p14:creationId xmlns:p14="http://schemas.microsoft.com/office/powerpoint/2010/main" val="3957750197"/>
       </p:ext>
     </p:extLst>
   </p:cSld>
@@ -796,7 +837,7 @@
             <a:fld id="{7332B432-ACDA-4023-A761-2BAB76577B62}" type="datetime1">
               <a:rPr lang="en-US" smtClean="0"/>
               <a:pPr/>
-              <a:t>1/10/2022</a:t>
+              <a:t>11-Jan-22</a:t>
             </a:fld>
             <a:endParaRPr lang="en-US" dirty="0"/>
           </a:p>
@@ -848,7 +889,7 @@
     </p:spTree>
     <p:extLst>
       <p:ext uri="{BB962C8B-B14F-4D97-AF65-F5344CB8AC3E}">
-        <p14:creationId xmlns="" xmlns:p14="http://schemas.microsoft.com/office/powerpoint/2010/main" val="2870318442"/>
+        <p14:creationId xmlns:p14="http://schemas.microsoft.com/office/powerpoint/2010/main" val="2870318442"/>
       </p:ext>
     </p:extLst>
   </p:cSld>
@@ -880,7 +921,7 @@
           <p:cNvPr id="15" name="Rectangle 14">
             <a:extLst>
               <a:ext uri="{FF2B5EF4-FFF2-40B4-BE49-F238E27FC236}">
-                <a16:creationId xmlns="" xmlns:a16="http://schemas.microsoft.com/office/drawing/2014/main" id="{0A4A1889-E37C-4EC3-9E41-9DAD221CF389}"/>
+                <a16:creationId xmlns:a16="http://schemas.microsoft.com/office/drawing/2014/main" id="{0A4A1889-E37C-4EC3-9E41-9DAD221CF389}"/>
               </a:ext>
             </a:extLst>
           </p:cNvPr>
@@ -1077,7 +1118,7 @@
           <p:cNvPr id="16" name="Group 15">
             <a:extLst>
               <a:ext uri="{FF2B5EF4-FFF2-40B4-BE49-F238E27FC236}">
-                <a16:creationId xmlns="" xmlns:a16="http://schemas.microsoft.com/office/drawing/2014/main" id="{1683EB04-C23E-490C-A1A6-030CF79D23C8}"/>
+                <a16:creationId xmlns:a16="http://schemas.microsoft.com/office/drawing/2014/main" id="{1683EB04-C23E-490C-A1A6-030CF79D23C8}"/>
               </a:ext>
             </a:extLst>
           </p:cNvPr>
@@ -1097,7 +1138,7 @@
             <p:cNvPr id="17" name="Straight Connector 16">
               <a:extLst>
                 <a:ext uri="{FF2B5EF4-FFF2-40B4-BE49-F238E27FC236}">
-                  <a16:creationId xmlns="" xmlns:a16="http://schemas.microsoft.com/office/drawing/2014/main" id="{F8A84C03-E1CA-4A4E-81D6-9BB0C335B7A0}"/>
+                  <a16:creationId xmlns:a16="http://schemas.microsoft.com/office/drawing/2014/main" id="{F8A84C03-E1CA-4A4E-81D6-9BB0C335B7A0}"/>
                 </a:ext>
               </a:extLst>
             </p:cNvPr>
@@ -1145,7 +1186,7 @@
             <p:cNvPr id="18" name="Straight Connector 17">
               <a:extLst>
                 <a:ext uri="{FF2B5EF4-FFF2-40B4-BE49-F238E27FC236}">
-                  <a16:creationId xmlns="" xmlns:a16="http://schemas.microsoft.com/office/drawing/2014/main" id="{4A26FB5A-D5D1-4DAB-AC43-7F51A7F2D197}"/>
+                  <a16:creationId xmlns:a16="http://schemas.microsoft.com/office/drawing/2014/main" id="{4A26FB5A-D5D1-4DAB-AC43-7F51A7F2D197}"/>
                 </a:ext>
               </a:extLst>
             </p:cNvPr>
@@ -1193,7 +1234,7 @@
             <p:cNvPr id="19" name="Straight Connector 18">
               <a:extLst>
                 <a:ext uri="{FF2B5EF4-FFF2-40B4-BE49-F238E27FC236}">
-                  <a16:creationId xmlns="" xmlns:a16="http://schemas.microsoft.com/office/drawing/2014/main" id="{49303F14-E560-4C02-94F4-B4695FE26813}"/>
+                  <a16:creationId xmlns:a16="http://schemas.microsoft.com/office/drawing/2014/main" id="{49303F14-E560-4C02-94F4-B4695FE26813}"/>
                 </a:ext>
               </a:extLst>
             </p:cNvPr>
@@ -1397,7 +1438,7 @@
             <a:fld id="{D9C646AA-F36E-4540-911D-FFFC0A0EF24A}" type="datetime1">
               <a:rPr lang="en-US" smtClean="0"/>
               <a:pPr/>
-              <a:t>1/10/2022</a:t>
+              <a:t>11-Jan-22</a:t>
             </a:fld>
             <a:endParaRPr lang="en-US" dirty="0"/>
           </a:p>
@@ -1481,7 +1522,7 @@
     </p:spTree>
     <p:extLst>
       <p:ext uri="{BB962C8B-B14F-4D97-AF65-F5344CB8AC3E}">
-        <p14:creationId xmlns="" xmlns:p14="http://schemas.microsoft.com/office/powerpoint/2010/main" val="3499058101"/>
+        <p14:creationId xmlns:p14="http://schemas.microsoft.com/office/powerpoint/2010/main" val="3499058101"/>
       </p:ext>
     </p:extLst>
   </p:cSld>
@@ -1719,7 +1760,7 @@
             <a:fld id="{69186D26-FA5F-4637-B602-B7C2DC34CFD4}" type="datetime1">
               <a:rPr lang="en-US" smtClean="0"/>
               <a:pPr/>
-              <a:t>1/10/2022</a:t>
+              <a:t>11-Jan-22</a:t>
             </a:fld>
             <a:endParaRPr lang="en-US" dirty="0"/>
           </a:p>
@@ -1771,7 +1812,7 @@
     </p:spTree>
     <p:extLst>
       <p:ext uri="{BB962C8B-B14F-4D97-AF65-F5344CB8AC3E}">
-        <p14:creationId xmlns="" xmlns:p14="http://schemas.microsoft.com/office/powerpoint/2010/main" val="3290950385"/>
+        <p14:creationId xmlns:p14="http://schemas.microsoft.com/office/powerpoint/2010/main" val="3290950385"/>
       </p:ext>
     </p:extLst>
   </p:cSld>
@@ -2158,7 +2199,7 @@
             <a:fld id="{8A7F15D8-96D1-4781-BC50-CA8A088B2FE4}" type="datetime1">
               <a:rPr lang="en-US" smtClean="0"/>
               <a:pPr/>
-              <a:t>1/10/2022</a:t>
+              <a:t>11-Jan-22</a:t>
             </a:fld>
             <a:endParaRPr lang="en-US" dirty="0"/>
           </a:p>
@@ -2210,7 +2251,7 @@
     </p:spTree>
     <p:extLst>
       <p:ext uri="{BB962C8B-B14F-4D97-AF65-F5344CB8AC3E}">
-        <p14:creationId xmlns="" xmlns:p14="http://schemas.microsoft.com/office/powerpoint/2010/main" val="545147351"/>
+        <p14:creationId xmlns:p14="http://schemas.microsoft.com/office/powerpoint/2010/main" val="545147351"/>
       </p:ext>
     </p:extLst>
   </p:cSld>
@@ -2278,7 +2319,7 @@
             <a:fld id="{F9A96C99-B8F8-4528-BD05-0E16E943DC09}" type="datetime1">
               <a:rPr lang="en-US" smtClean="0"/>
               <a:pPr/>
-              <a:t>1/10/2022</a:t>
+              <a:t>11-Jan-22</a:t>
             </a:fld>
             <a:endParaRPr lang="en-US" dirty="0"/>
           </a:p>
@@ -2330,7 +2371,7 @@
     </p:spTree>
     <p:extLst>
       <p:ext uri="{BB962C8B-B14F-4D97-AF65-F5344CB8AC3E}">
-        <p14:creationId xmlns="" xmlns:p14="http://schemas.microsoft.com/office/powerpoint/2010/main" val="3381700984"/>
+        <p14:creationId xmlns:p14="http://schemas.microsoft.com/office/powerpoint/2010/main" val="3381700984"/>
       </p:ext>
     </p:extLst>
   </p:cSld>
@@ -2375,7 +2416,7 @@
             <a:fld id="{03636942-C211-4B28-8DBD-C953E00AF71B}" type="datetime1">
               <a:rPr lang="en-US" smtClean="0"/>
               <a:pPr/>
-              <a:t>1/10/2022</a:t>
+              <a:t>11-Jan-22</a:t>
             </a:fld>
             <a:endParaRPr lang="en-US" dirty="0"/>
           </a:p>
@@ -2427,7 +2468,7 @@
     </p:spTree>
     <p:extLst>
       <p:ext uri="{BB962C8B-B14F-4D97-AF65-F5344CB8AC3E}">
-        <p14:creationId xmlns="" xmlns:p14="http://schemas.microsoft.com/office/powerpoint/2010/main" val="1969161062"/>
+        <p14:creationId xmlns:p14="http://schemas.microsoft.com/office/powerpoint/2010/main" val="1969161062"/>
       </p:ext>
     </p:extLst>
   </p:cSld>
@@ -2459,7 +2500,7 @@
           <p:cNvPr id="10" name="Rectangle 9">
             <a:extLst>
               <a:ext uri="{FF2B5EF4-FFF2-40B4-BE49-F238E27FC236}">
-                <a16:creationId xmlns="" xmlns:a16="http://schemas.microsoft.com/office/drawing/2014/main" id="{D5E1BBF9-8BEF-4353-BA68-30AAF9EBD8D8}"/>
+                <a16:creationId xmlns:a16="http://schemas.microsoft.com/office/drawing/2014/main" id="{D5E1BBF9-8BEF-4353-BA68-30AAF9EBD8D8}"/>
               </a:ext>
             </a:extLst>
           </p:cNvPr>
@@ -2506,7 +2547,7 @@
           <p:cNvPr id="13" name="Rectangle 12">
             <a:extLst>
               <a:ext uri="{FF2B5EF4-FFF2-40B4-BE49-F238E27FC236}">
-                <a16:creationId xmlns="" xmlns:a16="http://schemas.microsoft.com/office/drawing/2014/main" id="{5B941C21-2A5D-4912-AB06-1BB0C0EB6AE1}"/>
+                <a16:creationId xmlns:a16="http://schemas.microsoft.com/office/drawing/2014/main" id="{5B941C21-2A5D-4912-AB06-1BB0C0EB6AE1}"/>
               </a:ext>
             </a:extLst>
           </p:cNvPr>
@@ -2794,7 +2835,7 @@
             <a:fld id="{7E8D12A6-918A-48BD-8CB9-CA713993B0EA}" type="datetime1">
               <a:rPr lang="en-US" smtClean="0"/>
               <a:pPr/>
-              <a:t>1/10/2022</a:t>
+              <a:t>11-Jan-22</a:t>
             </a:fld>
             <a:endParaRPr lang="en-US" dirty="0"/>
           </a:p>
@@ -2871,7 +2912,7 @@
     </p:spTree>
     <p:extLst>
       <p:ext uri="{BB962C8B-B14F-4D97-AF65-F5344CB8AC3E}">
-        <p14:creationId xmlns="" xmlns:p14="http://schemas.microsoft.com/office/powerpoint/2010/main" val="2007531342"/>
+        <p14:creationId xmlns:p14="http://schemas.microsoft.com/office/powerpoint/2010/main" val="2007531342"/>
       </p:ext>
     </p:extLst>
   </p:cSld>
@@ -2903,7 +2944,7 @@
           <p:cNvPr id="11" name="Rectangle 10">
             <a:extLst>
               <a:ext uri="{FF2B5EF4-FFF2-40B4-BE49-F238E27FC236}">
-                <a16:creationId xmlns="" xmlns:a16="http://schemas.microsoft.com/office/drawing/2014/main" id="{E687CA98-D9C7-497F-A1DA-7D22F8753BCE}"/>
+                <a16:creationId xmlns:a16="http://schemas.microsoft.com/office/drawing/2014/main" id="{E687CA98-D9C7-497F-A1DA-7D22F8753BCE}"/>
               </a:ext>
             </a:extLst>
           </p:cNvPr>
@@ -3057,7 +3098,7 @@
             <a:fld id="{E778CE86-875F-4587-BCF6-FA054AFC0D53}" type="datetime1">
               <a:rPr lang="en-US" smtClean="0"/>
               <a:pPr/>
-              <a:t>1/10/2022</a:t>
+              <a:t>11-Jan-22</a:t>
             </a:fld>
             <a:endParaRPr lang="en-US" dirty="0"/>
           </a:p>
@@ -3140,7 +3181,7 @@
           <p:cNvPr id="12" name="Rectangle 11">
             <a:extLst>
               <a:ext uri="{FF2B5EF4-FFF2-40B4-BE49-F238E27FC236}">
-                <a16:creationId xmlns="" xmlns:a16="http://schemas.microsoft.com/office/drawing/2014/main" id="{F8B3D8CC-BB13-41A5-8F34-B8E84A4F9534}"/>
+                <a16:creationId xmlns:a16="http://schemas.microsoft.com/office/drawing/2014/main" id="{F8B3D8CC-BB13-41A5-8F34-B8E84A4F9534}"/>
               </a:ext>
             </a:extLst>
           </p:cNvPr>
@@ -3305,7 +3346,7 @@
     </p:spTree>
     <p:extLst>
       <p:ext uri="{BB962C8B-B14F-4D97-AF65-F5344CB8AC3E}">
-        <p14:creationId xmlns="" xmlns:p14="http://schemas.microsoft.com/office/powerpoint/2010/main" val="1988086638"/>
+        <p14:creationId xmlns:p14="http://schemas.microsoft.com/office/powerpoint/2010/main" val="1988086638"/>
       </p:ext>
     </p:extLst>
   </p:cSld>
@@ -3342,7 +3383,7 @@
           <p:cNvPr id="9" name="Rectangle 8">
             <a:extLst>
               <a:ext uri="{FF2B5EF4-FFF2-40B4-BE49-F238E27FC236}">
-                <a16:creationId xmlns="" xmlns:a16="http://schemas.microsoft.com/office/drawing/2014/main" id="{1E94681D-2A4C-4A8D-B9B5-31D440D0328D}"/>
+                <a16:creationId xmlns:a16="http://schemas.microsoft.com/office/drawing/2014/main" id="{1E94681D-2A4C-4A8D-B9B5-31D440D0328D}"/>
               </a:ext>
             </a:extLst>
           </p:cNvPr>
@@ -3575,7 +3616,7 @@
             <a:fld id="{F6FA2B21-3FCD-4721-B95C-427943F61125}" type="datetime1">
               <a:rPr lang="en-US" smtClean="0"/>
               <a:pPr/>
-              <a:t>1/10/2022</a:t>
+              <a:t>11-Jan-22</a:t>
             </a:fld>
             <a:endParaRPr lang="en-US" dirty="0"/>
           </a:p>
@@ -3665,7 +3706,7 @@
     </p:spTree>
     <p:extLst>
       <p:ext uri="{BB962C8B-B14F-4D97-AF65-F5344CB8AC3E}">
-        <p14:creationId xmlns="" xmlns:p14="http://schemas.microsoft.com/office/powerpoint/2010/main" val="2116409438"/>
+        <p14:creationId xmlns:p14="http://schemas.microsoft.com/office/powerpoint/2010/main" val="2116409438"/>
       </p:ext>
     </p:extLst>
   </p:cSld>
@@ -4056,10 +4097,10 @@
           <p:cNvPr id="4" name="Picture 3">
             <a:extLst>
               <a:ext uri="{FF2B5EF4-FFF2-40B4-BE49-F238E27FC236}">
-                <a16:creationId xmlns="" xmlns:a16="http://schemas.microsoft.com/office/drawing/2014/main" id="{62BA1780-A246-4C7F-9267-727EF2F4E785}"/>
+                <a16:creationId xmlns:a16="http://schemas.microsoft.com/office/drawing/2014/main" id="{62BA1780-A246-4C7F-9267-727EF2F4E785}"/>
               </a:ext>
               <a:ext uri="{C183D7F6-B498-43B3-948B-1728B52AA6E4}">
-                <adec:decorative xmlns="" xmlns:adec="http://schemas.microsoft.com/office/drawing/2017/decorative" val="1"/>
+                <adec:decorative xmlns:adec="http://schemas.microsoft.com/office/drawing/2017/decorative" val="1"/>
               </a:ext>
             </a:extLst>
           </p:cNvPr>
@@ -4088,10 +4129,10 @@
           <p:cNvPr id="19" name="Rectangle 18">
             <a:extLst>
               <a:ext uri="{FF2B5EF4-FFF2-40B4-BE49-F238E27FC236}">
-                <a16:creationId xmlns="" xmlns:a16="http://schemas.microsoft.com/office/drawing/2014/main" id="{2644B391-9BFE-445C-A9EC-F544BB85FBC7}"/>
+                <a16:creationId xmlns:a16="http://schemas.microsoft.com/office/drawing/2014/main" id="{2644B391-9BFE-445C-A9EC-F544BB85FBC7}"/>
               </a:ext>
               <a:ext uri="{C183D7F6-B498-43B3-948B-1728B52AA6E4}">
-                <adec:decorative xmlns="" xmlns:adec="http://schemas.microsoft.com/office/drawing/2017/decorative" val="1"/>
+                <adec:decorative xmlns:adec="http://schemas.microsoft.com/office/drawing/2017/decorative" val="1"/>
               </a:ext>
             </a:extLst>
           </p:cNvPr>
@@ -4101,7 +4142,7 @@
           <p:nvPr>
             <p:extLst>
               <p:ext uri="{386F3935-93C4-4BCD-93E2-E3B085C9AB24}">
-                <p16:designElem xmlns="" xmlns:p16="http://schemas.microsoft.com/office/powerpoint/2015/main" val="1"/>
+                <p16:designElem xmlns:p16="http://schemas.microsoft.com/office/powerpoint/2015/main" val="1"/>
               </p:ext>
             </p:extLst>
           </p:nvPr>
@@ -4133,10 +4174,10 @@
           <p:cNvPr id="21" name="Rectangle 20">
             <a:extLst>
               <a:ext uri="{FF2B5EF4-FFF2-40B4-BE49-F238E27FC236}">
-                <a16:creationId xmlns="" xmlns:a16="http://schemas.microsoft.com/office/drawing/2014/main" id="{80F26E69-87D9-4655-AE7B-280A87AA3CAD}"/>
+                <a16:creationId xmlns:a16="http://schemas.microsoft.com/office/drawing/2014/main" id="{80F26E69-87D9-4655-AE7B-280A87AA3CAD}"/>
               </a:ext>
               <a:ext uri="{C183D7F6-B498-43B3-948B-1728B52AA6E4}">
-                <adec:decorative xmlns="" xmlns:adec="http://schemas.microsoft.com/office/drawing/2017/decorative" val="1"/>
+                <adec:decorative xmlns:adec="http://schemas.microsoft.com/office/drawing/2017/decorative" val="1"/>
               </a:ext>
             </a:extLst>
           </p:cNvPr>
@@ -4146,7 +4187,7 @@
           <p:nvPr>
             <p:extLst>
               <p:ext uri="{386F3935-93C4-4BCD-93E2-E3B085C9AB24}">
-                <p16:designElem xmlns="" xmlns:p16="http://schemas.microsoft.com/office/powerpoint/2015/main" val="1"/>
+                <p16:designElem xmlns:p16="http://schemas.microsoft.com/office/powerpoint/2015/main" val="1"/>
               </p:ext>
             </p:extLst>
           </p:nvPr>
@@ -4177,7 +4218,7 @@
           <p:cNvPr id="2" name="Title 1">
             <a:extLst>
               <a:ext uri="{FF2B5EF4-FFF2-40B4-BE49-F238E27FC236}">
-                <a16:creationId xmlns="" xmlns:a16="http://schemas.microsoft.com/office/drawing/2014/main" id="{C0D7398C-75E5-4CB0-BA4F-D7D5CF2495D4}"/>
+                <a16:creationId xmlns:a16="http://schemas.microsoft.com/office/drawing/2014/main" id="{C0D7398C-75E5-4CB0-BA4F-D7D5CF2495D4}"/>
               </a:ext>
             </a:extLst>
           </p:cNvPr>
@@ -4201,7 +4242,7 @@
           <a:lstStyle/>
           <a:p>
             <a:r>
-              <a:rPr sz="4400" smtClean="0">
+              <a:rPr sz="4400">
                 <a:solidFill>
                   <a:schemeClr val="tx1"/>
                 </a:solidFill>
@@ -4221,7 +4262,7 @@
           <p:cNvPr id="3" name="Subtitle 2">
             <a:extLst>
               <a:ext uri="{FF2B5EF4-FFF2-40B4-BE49-F238E27FC236}">
-                <a16:creationId xmlns="" xmlns:a16="http://schemas.microsoft.com/office/drawing/2014/main" id="{5C5BFB45-FC34-495C-9C68-F9641246C2EE}"/>
+                <a16:creationId xmlns:a16="http://schemas.microsoft.com/office/drawing/2014/main" id="{5C5BFB45-FC34-495C-9C68-F9641246C2EE}"/>
               </a:ext>
             </a:extLst>
           </p:cNvPr>
@@ -4245,7 +4286,7 @@
           <a:lstStyle/>
           <a:p>
             <a:r>
-              <a:rPr lang="en-US" dirty="0" err="1" smtClean="0">
+              <a:rPr lang="en-US" dirty="0" err="1">
                 <a:solidFill>
                   <a:schemeClr val="tx1"/>
                 </a:solidFill>
@@ -4253,58 +4294,20 @@
               <a:t>Alexandru</a:t>
             </a:r>
             <a:r>
-              <a:rPr lang="en-US" dirty="0" smtClean="0">
-                <a:solidFill>
-                  <a:schemeClr val="tx1"/>
-                </a:solidFill>
-              </a:rPr>
-              <a:t> </a:t>
-            </a:r>
-            <a:r>
-              <a:rPr lang="en-US" dirty="0" err="1" smtClean="0">
+              <a:rPr lang="en-US" dirty="0">
+                <a:solidFill>
+                  <a:schemeClr val="tx1"/>
+                </a:solidFill>
+              </a:rPr>
+              <a:t> </a:t>
+            </a:r>
+            <a:r>
+              <a:rPr lang="en-US" dirty="0" err="1">
                 <a:solidFill>
                   <a:schemeClr val="tx1"/>
                 </a:solidFill>
               </a:rPr>
               <a:t>Sabou</a:t>
-            </a:r>
-            <a:endParaRPr lang="en-US" dirty="0" smtClean="0">
-              <a:solidFill>
-                <a:schemeClr val="tx1"/>
-              </a:solidFill>
-            </a:endParaRPr>
-          </a:p>
-          <a:p>
-            <a:r>
-              <a:rPr lang="en-US" dirty="0" smtClean="0">
-                <a:solidFill>
-                  <a:schemeClr val="tx1"/>
-                </a:solidFill>
-              </a:rPr>
-              <a:t>Adam </a:t>
-            </a:r>
-            <a:r>
-              <a:rPr lang="en-US" dirty="0" err="1" smtClean="0">
-                <a:solidFill>
-                  <a:schemeClr val="tx1"/>
-                </a:solidFill>
-              </a:rPr>
-              <a:t>Varga</a:t>
-            </a:r>
-            <a:endParaRPr lang="en-US" dirty="0" smtClean="0">
-              <a:solidFill>
-                <a:schemeClr val="tx1"/>
-              </a:solidFill>
-            </a:endParaRPr>
-          </a:p>
-          <a:p>
-            <a:r>
-              <a:rPr lang="en-US" dirty="0" smtClean="0">
-                <a:solidFill>
-                  <a:schemeClr val="tx1"/>
-                </a:solidFill>
-              </a:rPr>
-              <a:t>Anca Trandafir</a:t>
             </a:r>
             <a:endParaRPr lang="en-US" dirty="0">
               <a:solidFill>
@@ -4312,12 +4315,45 @@
               </a:solidFill>
             </a:endParaRPr>
           </a:p>
+          <a:p>
+            <a:r>
+              <a:rPr lang="en-US" dirty="0">
+                <a:solidFill>
+                  <a:schemeClr val="tx1"/>
+                </a:solidFill>
+              </a:rPr>
+              <a:t>Adam </a:t>
+            </a:r>
+            <a:r>
+              <a:rPr lang="en-US" dirty="0" err="1">
+                <a:solidFill>
+                  <a:schemeClr val="tx1"/>
+                </a:solidFill>
+              </a:rPr>
+              <a:t>Varga</a:t>
+            </a:r>
+            <a:endParaRPr lang="en-US" dirty="0">
+              <a:solidFill>
+                <a:schemeClr val="tx1"/>
+              </a:solidFill>
+            </a:endParaRPr>
+          </a:p>
+          <a:p>
+            <a:r>
+              <a:rPr lang="en-US" dirty="0">
+                <a:solidFill>
+                  <a:schemeClr val="tx1"/>
+                </a:solidFill>
+              </a:rPr>
+              <a:t>Anca Trandafir</a:t>
+            </a:r>
+          </a:p>
         </p:txBody>
       </p:sp>
     </p:spTree>
     <p:extLst>
       <p:ext uri="{BB962C8B-B14F-4D97-AF65-F5344CB8AC3E}">
-        <p14:creationId xmlns="" xmlns:p14="http://schemas.microsoft.com/office/powerpoint/2010/main" val="2152082915"/>
+        <p14:creationId xmlns:p14="http://schemas.microsoft.com/office/powerpoint/2010/main" val="2152082915"/>
       </p:ext>
     </p:extLst>
   </p:cSld>
@@ -4349,7 +4385,7 @@
           <p:cNvPr id="2" name="Title 1">
             <a:extLst>
               <a:ext uri="{FF2B5EF4-FFF2-40B4-BE49-F238E27FC236}">
-                <a16:creationId xmlns="" xmlns:a16="http://schemas.microsoft.com/office/drawing/2014/main" id="{BD534356-4D50-4828-8276-9C5B86969E96}"/>
+                <a16:creationId xmlns:a16="http://schemas.microsoft.com/office/drawing/2014/main" id="{BD534356-4D50-4828-8276-9C5B86969E96}"/>
               </a:ext>
             </a:extLst>
           </p:cNvPr>
@@ -4398,7 +4434,7 @@
           <p:cNvPr id="5" name="Content Placeholder 4" descr="Graphical user interface, text, application&#10;&#10;Description automatically generated">
             <a:extLst>
               <a:ext uri="{FF2B5EF4-FFF2-40B4-BE49-F238E27FC236}">
-                <a16:creationId xmlns="" xmlns:a16="http://schemas.microsoft.com/office/drawing/2014/main" id="{EA66A172-B444-4B44-8BFA-D573647A2DF7}"/>
+                <a16:creationId xmlns:a16="http://schemas.microsoft.com/office/drawing/2014/main" id="{EA66A172-B444-4B44-8BFA-D573647A2DF7}"/>
               </a:ext>
             </a:extLst>
           </p:cNvPr>
@@ -4425,7 +4461,7 @@
     </p:spTree>
     <p:extLst>
       <p:ext uri="{BB962C8B-B14F-4D97-AF65-F5344CB8AC3E}">
-        <p14:creationId xmlns="" xmlns:p14="http://schemas.microsoft.com/office/powerpoint/2010/main" val="2778878262"/>
+        <p14:creationId xmlns:p14="http://schemas.microsoft.com/office/powerpoint/2010/main" val="2778878262"/>
       </p:ext>
     </p:extLst>
   </p:cSld>
@@ -4457,7 +4493,7 @@
           <p:cNvPr id="2" name="Title 1">
             <a:extLst>
               <a:ext uri="{FF2B5EF4-FFF2-40B4-BE49-F238E27FC236}">
-                <a16:creationId xmlns="" xmlns:a16="http://schemas.microsoft.com/office/drawing/2014/main" id="{66109DDC-F50F-4BEE-BAB5-19618758B376}"/>
+                <a16:creationId xmlns:a16="http://schemas.microsoft.com/office/drawing/2014/main" id="{66109DDC-F50F-4BEE-BAB5-19618758B376}"/>
               </a:ext>
             </a:extLst>
           </p:cNvPr>
@@ -5638,19 +5674,6 @@
               </a:rPr>
               <a:t> </a:t>
             </a:r>
-            <a:r>
-              <a:rPr kumimoji="0" lang="en-US" altLang="en-US" sz="4000" b="0" i="0" u="none" strike="noStrike" cap="none" normalizeH="0" baseline="0" dirty="0">
-                <a:ln>
-                  <a:noFill/>
-                </a:ln>
-                <a:solidFill>
-                  <a:schemeClr val="tx1"/>
-                </a:solidFill>
-                <a:effectLst/>
-                <a:latin typeface="Arial" panose="020B0604020202020204" pitchFamily="34" charset="0"/>
-              </a:rPr>
-              <a:t/>
-            </a:r>
             <a:br>
               <a:rPr kumimoji="0" lang="en-US" altLang="en-US" sz="4000" b="0" i="0" u="none" strike="noStrike" cap="none" normalizeH="0" baseline="0" dirty="0">
                 <a:ln>
@@ -5672,7 +5695,7 @@
           <p:cNvPr id="5" name="Picture 4" descr="A picture containing text&#10;&#10;Description automatically generated">
             <a:extLst>
               <a:ext uri="{FF2B5EF4-FFF2-40B4-BE49-F238E27FC236}">
-                <a16:creationId xmlns="" xmlns:a16="http://schemas.microsoft.com/office/drawing/2014/main" id="{3A0E9B86-1784-459B-9201-CA72AB7FB42E}"/>
+                <a16:creationId xmlns:a16="http://schemas.microsoft.com/office/drawing/2014/main" id="{3A0E9B86-1784-459B-9201-CA72AB7FB42E}"/>
               </a:ext>
             </a:extLst>
           </p:cNvPr>
@@ -5702,7 +5725,7 @@
           <p:cNvPr id="6" name="Picture 5" descr="Text, letter&#10;&#10;Description automatically generated">
             <a:extLst>
               <a:ext uri="{FF2B5EF4-FFF2-40B4-BE49-F238E27FC236}">
-                <a16:creationId xmlns="" xmlns:a16="http://schemas.microsoft.com/office/drawing/2014/main" id="{15159FB6-5986-4B6A-A2B2-97887E6700C7}"/>
+                <a16:creationId xmlns:a16="http://schemas.microsoft.com/office/drawing/2014/main" id="{15159FB6-5986-4B6A-A2B2-97887E6700C7}"/>
               </a:ext>
             </a:extLst>
           </p:cNvPr>
@@ -5730,7 +5753,419 @@
     </p:spTree>
     <p:extLst>
       <p:ext uri="{BB962C8B-B14F-4D97-AF65-F5344CB8AC3E}">
-        <p14:creationId xmlns="" xmlns:p14="http://schemas.microsoft.com/office/powerpoint/2010/main" val="3230539754"/>
+        <p14:creationId xmlns:p14="http://schemas.microsoft.com/office/powerpoint/2010/main" val="3230539754"/>
+      </p:ext>
+    </p:extLst>
+  </p:cSld>
+  <p:clrMapOvr>
+    <a:masterClrMapping/>
+  </p:clrMapOvr>
+</p:sld>
+</file>
+
+<file path=ppt/slides/slide12.xml><?xml version="1.0" encoding="utf-8"?>
+<p:sld xmlns:a="http://schemas.openxmlformats.org/drawingml/2006/main" xmlns:r="http://schemas.openxmlformats.org/officeDocument/2006/relationships" xmlns:p="http://schemas.openxmlformats.org/presentationml/2006/main">
+  <p:cSld>
+    <p:spTree>
+      <p:nvGrpSpPr>
+        <p:cNvPr id="1" name=""/>
+        <p:cNvGrpSpPr/>
+        <p:nvPr/>
+      </p:nvGrpSpPr>
+      <p:grpSpPr>
+        <a:xfrm>
+          <a:off x="0" y="0"/>
+          <a:ext cx="0" cy="0"/>
+          <a:chOff x="0" y="0"/>
+          <a:chExt cx="0" cy="0"/>
+        </a:xfrm>
+      </p:grpSpPr>
+      <p:sp>
+        <p:nvSpPr>
+          <p:cNvPr id="2" name="Title 1">
+            <a:extLst>
+              <a:ext uri="{FF2B5EF4-FFF2-40B4-BE49-F238E27FC236}">
+                <a16:creationId xmlns:a16="http://schemas.microsoft.com/office/drawing/2014/main" id="{F351D823-DFF9-45B1-B8D9-CFE5A6B5F5E2}"/>
+              </a:ext>
+            </a:extLst>
+          </p:cNvPr>
+          <p:cNvSpPr>
+            <a:spLocks noGrp="1"/>
+          </p:cNvSpPr>
+          <p:nvPr>
+            <p:ph type="title"/>
+          </p:nvPr>
+        </p:nvSpPr>
+        <p:spPr/>
+        <p:txBody>
+          <a:bodyPr/>
+          <a:lstStyle/>
+          <a:p>
+            <a:r>
+              <a:rPr lang="en-US" dirty="0" err="1"/>
+              <a:t>Metoda</a:t>
+            </a:r>
+            <a:r>
+              <a:rPr lang="en-US" dirty="0"/>
+              <a:t> </a:t>
+            </a:r>
+            <a:r>
+              <a:rPr lang="en-US" dirty="0" err="1"/>
+              <a:t>celor</a:t>
+            </a:r>
+            <a:r>
+              <a:rPr lang="en-US" dirty="0"/>
+              <a:t> </a:t>
+            </a:r>
+            <a:r>
+              <a:rPr lang="en-US" dirty="0" err="1"/>
+              <a:t>mai</a:t>
+            </a:r>
+            <a:r>
+              <a:rPr lang="en-US" dirty="0"/>
+              <a:t> </a:t>
+            </a:r>
+            <a:r>
+              <a:rPr lang="en-US" dirty="0" err="1"/>
+              <a:t>mici</a:t>
+            </a:r>
+            <a:r>
+              <a:rPr lang="en-US" dirty="0"/>
+              <a:t> </a:t>
+            </a:r>
+            <a:r>
+              <a:rPr lang="en-US" dirty="0" err="1"/>
+              <a:t>patrate</a:t>
+            </a:r>
+            <a:endParaRPr lang="en-US" dirty="0"/>
+          </a:p>
+        </p:txBody>
+      </p:sp>
+      <p:pic>
+        <p:nvPicPr>
+          <p:cNvPr id="7" name="Content Placeholder 6">
+            <a:extLst>
+              <a:ext uri="{FF2B5EF4-FFF2-40B4-BE49-F238E27FC236}">
+                <a16:creationId xmlns:a16="http://schemas.microsoft.com/office/drawing/2014/main" id="{FA9CE0DB-0873-4F81-B623-05F595F239CD}"/>
+              </a:ext>
+            </a:extLst>
+          </p:cNvPr>
+          <p:cNvPicPr>
+            <a:picLocks noGrp="1" noChangeAspect="1"/>
+          </p:cNvPicPr>
+          <p:nvPr>
+            <p:ph idx="1"/>
+          </p:nvPr>
+        </p:nvPicPr>
+        <p:blipFill>
+          <a:blip r:embed="rId2"/>
+          <a:stretch>
+            <a:fillRect/>
+          </a:stretch>
+        </p:blipFill>
+        <p:spPr>
+          <a:xfrm>
+            <a:off x="926945" y="1877335"/>
+            <a:ext cx="8286997" cy="3849687"/>
+          </a:xfrm>
+        </p:spPr>
+      </p:pic>
+    </p:spTree>
+    <p:extLst>
+      <p:ext uri="{BB962C8B-B14F-4D97-AF65-F5344CB8AC3E}">
+        <p14:creationId xmlns:p14="http://schemas.microsoft.com/office/powerpoint/2010/main" val="1826519697"/>
+      </p:ext>
+    </p:extLst>
+  </p:cSld>
+  <p:clrMapOvr>
+    <a:masterClrMapping/>
+  </p:clrMapOvr>
+</p:sld>
+</file>
+
+<file path=ppt/slides/slide13.xml><?xml version="1.0" encoding="utf-8"?>
+<p:sld xmlns:a="http://schemas.openxmlformats.org/drawingml/2006/main" xmlns:r="http://schemas.openxmlformats.org/officeDocument/2006/relationships" xmlns:p="http://schemas.openxmlformats.org/presentationml/2006/main">
+  <p:cSld>
+    <p:spTree>
+      <p:nvGrpSpPr>
+        <p:cNvPr id="1" name=""/>
+        <p:cNvGrpSpPr/>
+        <p:nvPr/>
+      </p:nvGrpSpPr>
+      <p:grpSpPr>
+        <a:xfrm>
+          <a:off x="0" y="0"/>
+          <a:ext cx="0" cy="0"/>
+          <a:chOff x="0" y="0"/>
+          <a:chExt cx="0" cy="0"/>
+        </a:xfrm>
+      </p:grpSpPr>
+      <p:sp>
+        <p:nvSpPr>
+          <p:cNvPr id="2" name="Title 1">
+            <a:extLst>
+              <a:ext uri="{FF2B5EF4-FFF2-40B4-BE49-F238E27FC236}">
+                <a16:creationId xmlns:a16="http://schemas.microsoft.com/office/drawing/2014/main" id="{4EB7F89A-ADD2-402C-A5AE-89EC5BF9540F}"/>
+              </a:ext>
+            </a:extLst>
+          </p:cNvPr>
+          <p:cNvSpPr>
+            <a:spLocks noGrp="1"/>
+          </p:cNvSpPr>
+          <p:nvPr>
+            <p:ph type="title"/>
+          </p:nvPr>
+        </p:nvSpPr>
+        <p:spPr/>
+        <p:txBody>
+          <a:bodyPr/>
+          <a:lstStyle/>
+          <a:p>
+            <a:r>
+              <a:rPr lang="en-US" dirty="0"/>
+              <a:t>Gradient descending</a:t>
+            </a:r>
+          </a:p>
+        </p:txBody>
+      </p:sp>
+      <p:pic>
+        <p:nvPicPr>
+          <p:cNvPr id="5" name="Content Placeholder 4">
+            <a:extLst>
+              <a:ext uri="{FF2B5EF4-FFF2-40B4-BE49-F238E27FC236}">
+                <a16:creationId xmlns:a16="http://schemas.microsoft.com/office/drawing/2014/main" id="{1448B693-1A88-4AE0-B032-3D28DD9EB907}"/>
+              </a:ext>
+            </a:extLst>
+          </p:cNvPr>
+          <p:cNvPicPr>
+            <a:picLocks noGrp="1" noChangeAspect="1"/>
+          </p:cNvPicPr>
+          <p:nvPr>
+            <p:ph idx="1"/>
+          </p:nvPr>
+        </p:nvPicPr>
+        <p:blipFill>
+          <a:blip r:embed="rId2"/>
+          <a:stretch>
+            <a:fillRect/>
+          </a:stretch>
+        </p:blipFill>
+        <p:spPr>
+          <a:xfrm>
+            <a:off x="1066800" y="1903413"/>
+            <a:ext cx="7984794" cy="3849687"/>
+          </a:xfrm>
+        </p:spPr>
+      </p:pic>
+    </p:spTree>
+    <p:extLst>
+      <p:ext uri="{BB962C8B-B14F-4D97-AF65-F5344CB8AC3E}">
+        <p14:creationId xmlns:p14="http://schemas.microsoft.com/office/powerpoint/2010/main" val="3579249799"/>
+      </p:ext>
+    </p:extLst>
+  </p:cSld>
+  <p:clrMapOvr>
+    <a:masterClrMapping/>
+  </p:clrMapOvr>
+</p:sld>
+</file>
+
+<file path=ppt/slides/slide14.xml><?xml version="1.0" encoding="utf-8"?>
+<p:sld xmlns:a="http://schemas.openxmlformats.org/drawingml/2006/main" xmlns:r="http://schemas.openxmlformats.org/officeDocument/2006/relationships" xmlns:p="http://schemas.openxmlformats.org/presentationml/2006/main">
+  <p:cSld>
+    <p:spTree>
+      <p:nvGrpSpPr>
+        <p:cNvPr id="1" name=""/>
+        <p:cNvGrpSpPr/>
+        <p:nvPr/>
+      </p:nvGrpSpPr>
+      <p:grpSpPr>
+        <a:xfrm>
+          <a:off x="0" y="0"/>
+          <a:ext cx="0" cy="0"/>
+          <a:chOff x="0" y="0"/>
+          <a:chExt cx="0" cy="0"/>
+        </a:xfrm>
+      </p:grpSpPr>
+      <p:sp>
+        <p:nvSpPr>
+          <p:cNvPr id="2" name="Title 1">
+            <a:extLst>
+              <a:ext uri="{FF2B5EF4-FFF2-40B4-BE49-F238E27FC236}">
+                <a16:creationId xmlns:a16="http://schemas.microsoft.com/office/drawing/2014/main" id="{5FEE17A6-28AA-4487-8B71-A8EACF35DAD0}"/>
+              </a:ext>
+            </a:extLst>
+          </p:cNvPr>
+          <p:cNvSpPr>
+            <a:spLocks noGrp="1"/>
+          </p:cNvSpPr>
+          <p:nvPr>
+            <p:ph type="title"/>
+          </p:nvPr>
+        </p:nvSpPr>
+        <p:spPr/>
+        <p:txBody>
+          <a:bodyPr/>
+          <a:lstStyle/>
+          <a:p>
+            <a:r>
+              <a:rPr lang="en-US" dirty="0" err="1"/>
+              <a:t>Regresie</a:t>
+            </a:r>
+            <a:r>
+              <a:rPr lang="en-US" dirty="0"/>
+              <a:t> </a:t>
+            </a:r>
+            <a:r>
+              <a:rPr lang="en-US" dirty="0" err="1"/>
+              <a:t>logistica</a:t>
+            </a:r>
+            <a:endParaRPr lang="en-US" dirty="0"/>
+          </a:p>
+        </p:txBody>
+      </p:sp>
+      <p:pic>
+        <p:nvPicPr>
+          <p:cNvPr id="5" name="Content Placeholder 4">
+            <a:extLst>
+              <a:ext uri="{FF2B5EF4-FFF2-40B4-BE49-F238E27FC236}">
+                <a16:creationId xmlns:a16="http://schemas.microsoft.com/office/drawing/2014/main" id="{2A579B76-2864-46DA-B7C4-A9847503FBF2}"/>
+              </a:ext>
+            </a:extLst>
+          </p:cNvPr>
+          <p:cNvPicPr>
+            <a:picLocks noGrp="1" noChangeAspect="1"/>
+          </p:cNvPicPr>
+          <p:nvPr>
+            <p:ph idx="1"/>
+          </p:nvPr>
+        </p:nvPicPr>
+        <p:blipFill>
+          <a:blip r:embed="rId2"/>
+          <a:stretch>
+            <a:fillRect/>
+          </a:stretch>
+        </p:blipFill>
+        <p:spPr>
+          <a:xfrm>
+            <a:off x="1066800" y="1748331"/>
+            <a:ext cx="7104192" cy="3849687"/>
+          </a:xfrm>
+        </p:spPr>
+      </p:pic>
+    </p:spTree>
+    <p:extLst>
+      <p:ext uri="{BB962C8B-B14F-4D97-AF65-F5344CB8AC3E}">
+        <p14:creationId xmlns:p14="http://schemas.microsoft.com/office/powerpoint/2010/main" val="833804083"/>
+      </p:ext>
+    </p:extLst>
+  </p:cSld>
+  <p:clrMapOvr>
+    <a:masterClrMapping/>
+  </p:clrMapOvr>
+</p:sld>
+</file>
+
+<file path=ppt/slides/slide15.xml><?xml version="1.0" encoding="utf-8"?>
+<p:sld xmlns:a="http://schemas.openxmlformats.org/drawingml/2006/main" xmlns:r="http://schemas.openxmlformats.org/officeDocument/2006/relationships" xmlns:p="http://schemas.openxmlformats.org/presentationml/2006/main">
+  <p:cSld>
+    <p:spTree>
+      <p:nvGrpSpPr>
+        <p:cNvPr id="1" name=""/>
+        <p:cNvGrpSpPr/>
+        <p:nvPr/>
+      </p:nvGrpSpPr>
+      <p:grpSpPr>
+        <a:xfrm>
+          <a:off x="0" y="0"/>
+          <a:ext cx="0" cy="0"/>
+          <a:chOff x="0" y="0"/>
+          <a:chExt cx="0" cy="0"/>
+        </a:xfrm>
+      </p:grpSpPr>
+      <p:sp>
+        <p:nvSpPr>
+          <p:cNvPr id="2" name="Title 1">
+            <a:extLst>
+              <a:ext uri="{FF2B5EF4-FFF2-40B4-BE49-F238E27FC236}">
+                <a16:creationId xmlns:a16="http://schemas.microsoft.com/office/drawing/2014/main" id="{2E2C0AF0-0501-402B-9CDC-3B7802F75585}"/>
+              </a:ext>
+            </a:extLst>
+          </p:cNvPr>
+          <p:cNvSpPr>
+            <a:spLocks noGrp="1"/>
+          </p:cNvSpPr>
+          <p:nvPr>
+            <p:ph type="title"/>
+          </p:nvPr>
+        </p:nvSpPr>
+        <p:spPr/>
+        <p:txBody>
+          <a:bodyPr/>
+          <a:lstStyle/>
+          <a:p>
+            <a:r>
+              <a:rPr lang="en-US" dirty="0" err="1"/>
+              <a:t>Bibliografie</a:t>
+            </a:r>
+            <a:endParaRPr lang="en-US" dirty="0"/>
+          </a:p>
+        </p:txBody>
+      </p:sp>
+      <p:sp>
+        <p:nvSpPr>
+          <p:cNvPr id="3" name="Content Placeholder 2">
+            <a:extLst>
+              <a:ext uri="{FF2B5EF4-FFF2-40B4-BE49-F238E27FC236}">
+                <a16:creationId xmlns:a16="http://schemas.microsoft.com/office/drawing/2014/main" id="{989CC1AB-E3BA-444F-8412-169444110472}"/>
+              </a:ext>
+            </a:extLst>
+          </p:cNvPr>
+          <p:cNvSpPr>
+            <a:spLocks noGrp="1"/>
+          </p:cNvSpPr>
+          <p:nvPr>
+            <p:ph idx="1"/>
+          </p:nvPr>
+        </p:nvSpPr>
+        <p:spPr/>
+        <p:txBody>
+          <a:bodyPr/>
+          <a:lstStyle/>
+          <a:p>
+            <a:r>
+              <a:rPr lang="en-US" dirty="0">
+                <a:hlinkClick r:id="rId2"/>
+              </a:rPr>
+              <a:t>http://www.cs.ubbcluj.ro/~lauras/test/docs/school/IA/2019-2020/lectures/curs05_ML_GD.pdf</a:t>
+            </a:r>
+            <a:r>
+              <a:rPr lang="en-US" dirty="0"/>
+              <a:t>, </a:t>
+            </a:r>
+            <a:r>
+              <a:rPr lang="en-US" dirty="0" err="1"/>
+              <a:t>Lauura</a:t>
+            </a:r>
+            <a:r>
+              <a:rPr lang="en-US" dirty="0"/>
+              <a:t> </a:t>
+            </a:r>
+            <a:r>
+              <a:rPr lang="en-US" dirty="0" err="1"/>
+              <a:t>Diosan</a:t>
+            </a:r>
+            <a:endParaRPr lang="en-US" dirty="0"/>
+          </a:p>
+          <a:p>
+            <a:endParaRPr lang="en-US" dirty="0"/>
+          </a:p>
+        </p:txBody>
+      </p:sp>
+    </p:spTree>
+    <p:extLst>
+      <p:ext uri="{BB962C8B-B14F-4D97-AF65-F5344CB8AC3E}">
+        <p14:creationId xmlns:p14="http://schemas.microsoft.com/office/powerpoint/2010/main" val="2442727423"/>
       </p:ext>
     </p:extLst>
   </p:cSld>
@@ -5762,7 +6197,7 @@
           <p:cNvPr id="2" name="Title 1">
             <a:extLst>
               <a:ext uri="{FF2B5EF4-FFF2-40B4-BE49-F238E27FC236}">
-                <a16:creationId xmlns="" xmlns:a16="http://schemas.microsoft.com/office/drawing/2014/main" id="{686BB512-7D2A-4187-843A-444A7885B6B4}"/>
+                <a16:creationId xmlns:a16="http://schemas.microsoft.com/office/drawing/2014/main" id="{686BB512-7D2A-4187-843A-444A7885B6B4}"/>
               </a:ext>
             </a:extLst>
           </p:cNvPr>
@@ -5790,7 +6225,7 @@
           <p:cNvPr id="3" name="Content Placeholder 2">
             <a:extLst>
               <a:ext uri="{FF2B5EF4-FFF2-40B4-BE49-F238E27FC236}">
-                <a16:creationId xmlns="" xmlns:a16="http://schemas.microsoft.com/office/drawing/2014/main" id="{8BB28126-B04C-4273-8CE7-76C13148255D}"/>
+                <a16:creationId xmlns:a16="http://schemas.microsoft.com/office/drawing/2014/main" id="{8BB28126-B04C-4273-8CE7-76C13148255D}"/>
               </a:ext>
             </a:extLst>
           </p:cNvPr>
@@ -5907,7 +6342,7 @@
           <p:cNvPr id="4" name="Title 1">
             <a:extLst>
               <a:ext uri="{FF2B5EF4-FFF2-40B4-BE49-F238E27FC236}">
-                <a16:creationId xmlns="" xmlns:a16="http://schemas.microsoft.com/office/drawing/2014/main" id="{4D6C2492-71B3-4CD3-8498-95386A3887B8}"/>
+                <a16:creationId xmlns:a16="http://schemas.microsoft.com/office/drawing/2014/main" id="{4D6C2492-71B3-4CD3-8498-95386A3887B8}"/>
               </a:ext>
             </a:extLst>
           </p:cNvPr>
@@ -5965,7 +6400,7 @@
           <p:cNvPr id="5" name="Content Placeholder 2">
             <a:extLst>
               <a:ext uri="{FF2B5EF4-FFF2-40B4-BE49-F238E27FC236}">
-                <a16:creationId xmlns="" xmlns:a16="http://schemas.microsoft.com/office/drawing/2014/main" id="{B98641DA-CDC6-4450-B297-C41A8DABA841}"/>
+                <a16:creationId xmlns:a16="http://schemas.microsoft.com/office/drawing/2014/main" id="{B98641DA-CDC6-4450-B297-C41A8DABA841}"/>
               </a:ext>
             </a:extLst>
           </p:cNvPr>
@@ -6210,7 +6645,7 @@
           </a:lstStyle>
           <a:p>
             <a:r>
-              <a:rPr lang="en-US" dirty="0" smtClean="0"/>
+              <a:rPr lang="en-US" dirty="0"/>
               <a:t>Dataset </a:t>
             </a:r>
             <a:r>
@@ -6330,7 +6765,7 @@
           <p:cNvPr id="7" name="Picture 6" descr="Graphical user interface, text, application&#10;&#10;Description automatically generated">
             <a:extLst>
               <a:ext uri="{FF2B5EF4-FFF2-40B4-BE49-F238E27FC236}">
-                <a16:creationId xmlns="" xmlns:a16="http://schemas.microsoft.com/office/drawing/2014/main" id="{84E79055-E290-4D59-8733-D4A543080A9A}"/>
+                <a16:creationId xmlns:a16="http://schemas.microsoft.com/office/drawing/2014/main" id="{84E79055-E290-4D59-8733-D4A543080A9A}"/>
               </a:ext>
             </a:extLst>
           </p:cNvPr>
@@ -6360,7 +6795,7 @@
           <p:cNvPr id="8" name="Content Placeholder 2">
             <a:extLst>
               <a:ext uri="{FF2B5EF4-FFF2-40B4-BE49-F238E27FC236}">
-                <a16:creationId xmlns="" xmlns:a16="http://schemas.microsoft.com/office/drawing/2014/main" id="{2BD63E92-C119-47F8-BC00-74888FD1537E}"/>
+                <a16:creationId xmlns:a16="http://schemas.microsoft.com/office/drawing/2014/main" id="{2BD63E92-C119-47F8-BC00-74888FD1537E}"/>
               </a:ext>
             </a:extLst>
           </p:cNvPr>
@@ -6636,7 +7071,7 @@
     </p:spTree>
     <p:extLst>
       <p:ext uri="{BB962C8B-B14F-4D97-AF65-F5344CB8AC3E}">
-        <p14:creationId xmlns="" xmlns:p14="http://schemas.microsoft.com/office/powerpoint/2010/main" val="1742244933"/>
+        <p14:creationId xmlns:p14="http://schemas.microsoft.com/office/powerpoint/2010/main" val="1742244933"/>
       </p:ext>
     </p:extLst>
   </p:cSld>
@@ -6668,7 +7103,7 @@
           <p:cNvPr id="2" name="Title 1">
             <a:extLst>
               <a:ext uri="{FF2B5EF4-FFF2-40B4-BE49-F238E27FC236}">
-                <a16:creationId xmlns="" xmlns:a16="http://schemas.microsoft.com/office/drawing/2014/main" id="{6BF29648-E7DA-4FBF-B38F-AC8DC4880A13}"/>
+                <a16:creationId xmlns:a16="http://schemas.microsoft.com/office/drawing/2014/main" id="{6BF29648-E7DA-4FBF-B38F-AC8DC4880A13}"/>
               </a:ext>
             </a:extLst>
           </p:cNvPr>
@@ -6714,7 +7149,7 @@
           <p:cNvPr id="3" name="Content Placeholder 2">
             <a:extLst>
               <a:ext uri="{FF2B5EF4-FFF2-40B4-BE49-F238E27FC236}">
-                <a16:creationId xmlns="" xmlns:a16="http://schemas.microsoft.com/office/drawing/2014/main" id="{450E5146-E606-4441-BD29-38628A835BE1}"/>
+                <a16:creationId xmlns:a16="http://schemas.microsoft.com/office/drawing/2014/main" id="{450E5146-E606-4441-BD29-38628A835BE1}"/>
               </a:ext>
             </a:extLst>
           </p:cNvPr>
@@ -7007,21 +7442,16 @@
             </a:r>
             <a:r>
               <a:rPr lang="en-US" sz="1200" dirty="0"/>
-              <a:t> </a:t>
-            </a:r>
-            <a:r>
-              <a:rPr lang="en-US" sz="1200" dirty="0" smtClean="0"/>
-              <a:t>replace(</a:t>
-            </a:r>
-            <a:r>
-              <a:rPr lang="en-US" sz="1200" dirty="0" err="1" smtClean="0"/>
+              <a:t> replace(</a:t>
+            </a:r>
+            <a:r>
+              <a:rPr lang="en-US" sz="1200" dirty="0" err="1"/>
               <a:t>encode_data</a:t>
             </a:r>
             <a:r>
-              <a:rPr lang="en-US" sz="1200" dirty="0" smtClean="0"/>
+              <a:rPr lang="en-US" sz="1200" dirty="0"/>
               <a:t>())</a:t>
             </a:r>
-            <a:endParaRPr lang="en-US" sz="1200" dirty="0"/>
           </a:p>
           <a:p>
             <a:endParaRPr lang="en-US" sz="1200" dirty="0"/>
@@ -7039,7 +7469,7 @@
           <p:cNvPr id="13" name="Picture 12" descr="Text&#10;&#10;Description automatically generated">
             <a:extLst>
               <a:ext uri="{FF2B5EF4-FFF2-40B4-BE49-F238E27FC236}">
-                <a16:creationId xmlns="" xmlns:a16="http://schemas.microsoft.com/office/drawing/2014/main" id="{59361855-5557-449F-91D7-9900D05E0C82}"/>
+                <a16:creationId xmlns:a16="http://schemas.microsoft.com/office/drawing/2014/main" id="{59361855-5557-449F-91D7-9900D05E0C82}"/>
               </a:ext>
             </a:extLst>
           </p:cNvPr>
@@ -7067,7 +7497,7 @@
     </p:spTree>
     <p:extLst>
       <p:ext uri="{BB962C8B-B14F-4D97-AF65-F5344CB8AC3E}">
-        <p14:creationId xmlns="" xmlns:p14="http://schemas.microsoft.com/office/powerpoint/2010/main" val="1167731387"/>
+        <p14:creationId xmlns:p14="http://schemas.microsoft.com/office/powerpoint/2010/main" val="1167731387"/>
       </p:ext>
     </p:extLst>
   </p:cSld>
@@ -7099,7 +7529,7 @@
           <p:cNvPr id="2" name="Title 1">
             <a:extLst>
               <a:ext uri="{FF2B5EF4-FFF2-40B4-BE49-F238E27FC236}">
-                <a16:creationId xmlns="" xmlns:a16="http://schemas.microsoft.com/office/drawing/2014/main" id="{A4C3EDA3-6371-42DB-8EE1-868794BB0BFC}"/>
+                <a16:creationId xmlns:a16="http://schemas.microsoft.com/office/drawing/2014/main" id="{A4C3EDA3-6371-42DB-8EE1-868794BB0BFC}"/>
               </a:ext>
             </a:extLst>
           </p:cNvPr>
@@ -7339,10 +7769,6 @@
               </a:rPr>
               <a:t> </a:t>
             </a:r>
-            <a:r>
-              <a:rPr lang="en-US" dirty="0"/>
-              <a:t/>
-            </a:r>
             <a:br>
               <a:rPr lang="en-US" dirty="0"/>
             </a:br>
@@ -7355,7 +7781,7 @@
           <p:cNvPr id="4" name="Content Placeholder 3" descr="Graphical user interface, text, application&#10;&#10;Description automatically generated">
             <a:extLst>
               <a:ext uri="{FF2B5EF4-FFF2-40B4-BE49-F238E27FC236}">
-                <a16:creationId xmlns="" xmlns:a16="http://schemas.microsoft.com/office/drawing/2014/main" id="{7E978DF6-D828-4DCA-9236-5C80432F6B69}"/>
+                <a16:creationId xmlns:a16="http://schemas.microsoft.com/office/drawing/2014/main" id="{7E978DF6-D828-4DCA-9236-5C80432F6B69}"/>
               </a:ext>
             </a:extLst>
           </p:cNvPr>
@@ -7387,7 +7813,7 @@
           <p:cNvPr id="5" name="Picture 4" descr="Graphical user interface, text, application, email&#10;&#10;Description automatically generated">
             <a:extLst>
               <a:ext uri="{FF2B5EF4-FFF2-40B4-BE49-F238E27FC236}">
-                <a16:creationId xmlns="" xmlns:a16="http://schemas.microsoft.com/office/drawing/2014/main" id="{2947592C-CA70-472E-AB1D-7F846D03F77E}"/>
+                <a16:creationId xmlns:a16="http://schemas.microsoft.com/office/drawing/2014/main" id="{2947592C-CA70-472E-AB1D-7F846D03F77E}"/>
               </a:ext>
             </a:extLst>
           </p:cNvPr>
@@ -7415,7 +7841,7 @@
     </p:spTree>
     <p:extLst>
       <p:ext uri="{BB962C8B-B14F-4D97-AF65-F5344CB8AC3E}">
-        <p14:creationId xmlns="" xmlns:p14="http://schemas.microsoft.com/office/powerpoint/2010/main" val="493415713"/>
+        <p14:creationId xmlns:p14="http://schemas.microsoft.com/office/powerpoint/2010/main" val="493415713"/>
       </p:ext>
     </p:extLst>
   </p:cSld>
@@ -7447,7 +7873,7 @@
           <p:cNvPr id="6" name="Picture 5" descr="Text, application&#10;&#10;Description automatically generated">
             <a:extLst>
               <a:ext uri="{FF2B5EF4-FFF2-40B4-BE49-F238E27FC236}">
-                <a16:creationId xmlns="" xmlns:a16="http://schemas.microsoft.com/office/drawing/2014/main" id="{9B5E46CF-BBF4-46A7-9F78-2C02DBFEF951}"/>
+                <a16:creationId xmlns:a16="http://schemas.microsoft.com/office/drawing/2014/main" id="{9B5E46CF-BBF4-46A7-9F78-2C02DBFEF951}"/>
               </a:ext>
             </a:extLst>
           </p:cNvPr>
@@ -7477,7 +7903,7 @@
           <p:cNvPr id="3" name="Content Placeholder 2">
             <a:extLst>
               <a:ext uri="{FF2B5EF4-FFF2-40B4-BE49-F238E27FC236}">
-                <a16:creationId xmlns="" xmlns:a16="http://schemas.microsoft.com/office/drawing/2014/main" id="{85AC37DB-3D33-45D6-961B-FF7349367A5A}"/>
+                <a16:creationId xmlns:a16="http://schemas.microsoft.com/office/drawing/2014/main" id="{85AC37DB-3D33-45D6-961B-FF7349367A5A}"/>
               </a:ext>
             </a:extLst>
           </p:cNvPr>
@@ -7920,7 +8346,7 @@
     </p:spTree>
     <p:extLst>
       <p:ext uri="{BB962C8B-B14F-4D97-AF65-F5344CB8AC3E}">
-        <p14:creationId xmlns="" xmlns:p14="http://schemas.microsoft.com/office/powerpoint/2010/main" val="64057239"/>
+        <p14:creationId xmlns:p14="http://schemas.microsoft.com/office/powerpoint/2010/main" val="64057239"/>
       </p:ext>
     </p:extLst>
   </p:cSld>
@@ -7952,7 +8378,7 @@
           <p:cNvPr id="2" name="Title 1">
             <a:extLst>
               <a:ext uri="{FF2B5EF4-FFF2-40B4-BE49-F238E27FC236}">
-                <a16:creationId xmlns="" xmlns:a16="http://schemas.microsoft.com/office/drawing/2014/main" id="{E44A01A9-9769-4A82-8FB9-E8FBB30D697C}"/>
+                <a16:creationId xmlns:a16="http://schemas.microsoft.com/office/drawing/2014/main" id="{E44A01A9-9769-4A82-8FB9-E8FBB30D697C}"/>
               </a:ext>
             </a:extLst>
           </p:cNvPr>
@@ -7997,7 +8423,7 @@
           <p:cNvPr id="6" name="Rectangle 1">
             <a:extLst>
               <a:ext uri="{FF2B5EF4-FFF2-40B4-BE49-F238E27FC236}">
-                <a16:creationId xmlns="" xmlns:a16="http://schemas.microsoft.com/office/drawing/2014/main" id="{385979F7-91B1-4524-8343-02A238EF57C6}"/>
+                <a16:creationId xmlns:a16="http://schemas.microsoft.com/office/drawing/2014/main" id="{385979F7-91B1-4524-8343-02A238EF57C6}"/>
               </a:ext>
             </a:extLst>
           </p:cNvPr>
@@ -8025,7 +8451,7 @@
           <a:effectLst/>
           <a:extLst>
             <a:ext uri="{91240B29-F687-4F45-9708-019B960494DF}">
-              <a14:hiddenLine xmlns="" xmlns:a14="http://schemas.microsoft.com/office/drawing/2010/main" w="9525">
+              <a14:hiddenLine xmlns:a14="http://schemas.microsoft.com/office/drawing/2010/main" w="9525">
                 <a:solidFill>
                   <a:schemeClr val="tx1"/>
                 </a:solidFill>
@@ -8035,7 +8461,7 @@
               </a14:hiddenLine>
             </a:ext>
             <a:ext uri="{AF507438-7753-43E0-B8FC-AC1667EBCBE1}">
-              <a14:hiddenEffects xmlns="" xmlns:a14="http://schemas.microsoft.com/office/drawing/2010/main">
+              <a14:hiddenEffects xmlns:a14="http://schemas.microsoft.com/office/drawing/2010/main">
                 <a:effectLst>
                   <a:outerShdw dist="35921" dir="2700000" algn="ctr" rotWithShape="0">
                     <a:schemeClr val="bg2"/>
@@ -8230,7 +8656,7 @@
           <p:cNvPr id="8" name="Picture 7" descr="Chart&#10;&#10;Description automatically generated">
             <a:extLst>
               <a:ext uri="{FF2B5EF4-FFF2-40B4-BE49-F238E27FC236}">
-                <a16:creationId xmlns="" xmlns:a16="http://schemas.microsoft.com/office/drawing/2014/main" id="{CD7EE484-7C3D-4DDD-81E8-D487992BD099}"/>
+                <a16:creationId xmlns:a16="http://schemas.microsoft.com/office/drawing/2014/main" id="{CD7EE484-7C3D-4DDD-81E8-D487992BD099}"/>
               </a:ext>
             </a:extLst>
           </p:cNvPr>
@@ -8258,7 +8684,7 @@
     </p:spTree>
     <p:extLst>
       <p:ext uri="{BB962C8B-B14F-4D97-AF65-F5344CB8AC3E}">
-        <p14:creationId xmlns="" xmlns:p14="http://schemas.microsoft.com/office/powerpoint/2010/main" val="758152732"/>
+        <p14:creationId xmlns:p14="http://schemas.microsoft.com/office/powerpoint/2010/main" val="758152732"/>
       </p:ext>
     </p:extLst>
   </p:cSld>
@@ -8290,7 +8716,7 @@
           <p:cNvPr id="2" name="Title 1">
             <a:extLst>
               <a:ext uri="{FF2B5EF4-FFF2-40B4-BE49-F238E27FC236}">
-                <a16:creationId xmlns="" xmlns:a16="http://schemas.microsoft.com/office/drawing/2014/main" id="{22B95949-5F63-4492-BFAE-94683A3BA411}"/>
+                <a16:creationId xmlns:a16="http://schemas.microsoft.com/office/drawing/2014/main" id="{22B95949-5F63-4492-BFAE-94683A3BA411}"/>
               </a:ext>
             </a:extLst>
           </p:cNvPr>
@@ -8323,97 +8749,85 @@
               <a:t> de </a:t>
             </a:r>
             <a:r>
-              <a:rPr lang="en-US" sz="2800" dirty="0" err="1" smtClean="0"/>
+              <a:rPr lang="en-US" sz="2800" dirty="0" err="1"/>
               <a:t>corelatie</a:t>
             </a:r>
-            <a:r>
-              <a:rPr lang="en-US" sz="2800" dirty="0" smtClean="0"/>
-              <a:t/>
-            </a:r>
             <a:br>
-              <a:rPr lang="en-US" sz="2800" dirty="0" smtClean="0"/>
+              <a:rPr lang="en-US" sz="2800" dirty="0"/>
             </a:br>
-            <a:r>
-              <a:rPr lang="en-US" sz="2800" dirty="0" smtClean="0"/>
-              <a:t/>
-            </a:r>
             <a:br>
-              <a:rPr lang="en-US" sz="2800" dirty="0" smtClean="0"/>
+              <a:rPr lang="en-US" sz="2800" dirty="0"/>
             </a:br>
             <a:r>
-              <a:rPr lang="en-US" sz="2000" dirty="0" err="1" smtClean="0"/>
+              <a:rPr lang="en-US" sz="2000" dirty="0" err="1"/>
               <a:t>arata</a:t>
             </a:r>
             <a:r>
-              <a:rPr lang="en-US" sz="2000" dirty="0" smtClean="0"/>
-              <a:t> </a:t>
-            </a:r>
-            <a:r>
-              <a:rPr lang="en-US" sz="2000" dirty="0" err="1" smtClean="0"/>
+              <a:rPr lang="en-US" sz="2000" dirty="0"/>
+              <a:t> </a:t>
+            </a:r>
+            <a:r>
+              <a:rPr lang="en-US" sz="2000" dirty="0" err="1"/>
               <a:t>corelatia</a:t>
             </a:r>
             <a:r>
-              <a:rPr lang="en-US" sz="2000" dirty="0" smtClean="0"/>
-              <a:t> </a:t>
-            </a:r>
-            <a:r>
-              <a:rPr lang="en-US" sz="2000" dirty="0" err="1" smtClean="0"/>
+              <a:rPr lang="en-US" sz="2000" dirty="0"/>
+              <a:t> </a:t>
+            </a:r>
+            <a:r>
+              <a:rPr lang="en-US" sz="2000" dirty="0" err="1"/>
               <a:t>dintre</a:t>
             </a:r>
             <a:r>
-              <a:rPr lang="en-US" sz="2000" dirty="0" smtClean="0"/>
-              <a:t> </a:t>
-            </a:r>
-            <a:r>
-              <a:rPr lang="en-US" sz="2000" dirty="0" err="1" smtClean="0"/>
+              <a:rPr lang="en-US" sz="2000" dirty="0"/>
+              <a:t> </a:t>
+            </a:r>
+            <a:r>
+              <a:rPr lang="en-US" sz="2000" dirty="0" err="1"/>
               <a:t>doua</a:t>
             </a:r>
             <a:r>
-              <a:rPr lang="en-US" sz="2000" dirty="0" smtClean="0"/>
-              <a:t> </a:t>
-            </a:r>
-            <a:r>
-              <a:rPr lang="en-US" sz="2000" dirty="0" err="1" smtClean="0"/>
+              <a:rPr lang="en-US" sz="2000" dirty="0"/>
+              <a:t> </a:t>
+            </a:r>
+            <a:r>
+              <a:rPr lang="en-US" sz="2000" dirty="0" err="1"/>
               <a:t>variabile</a:t>
             </a:r>
             <a:r>
-              <a:rPr lang="en-US" sz="2000" dirty="0" smtClean="0"/>
-              <a:t> </a:t>
-            </a:r>
-            <a:r>
-              <a:rPr lang="en-US" sz="2000" dirty="0" err="1" smtClean="0"/>
+              <a:rPr lang="en-US" sz="2000" dirty="0"/>
+              <a:t> </a:t>
+            </a:r>
+            <a:r>
+              <a:rPr lang="en-US" sz="2000" dirty="0" err="1"/>
               <a:t>pe</a:t>
             </a:r>
             <a:r>
-              <a:rPr lang="en-US" sz="2000" dirty="0" smtClean="0"/>
-              <a:t> </a:t>
-            </a:r>
-            <a:r>
-              <a:rPr lang="en-US" sz="2000" dirty="0" err="1" smtClean="0"/>
+              <a:rPr lang="en-US" sz="2000" dirty="0"/>
+              <a:t> </a:t>
+            </a:r>
+            <a:r>
+              <a:rPr lang="en-US" sz="2000" dirty="0" err="1"/>
               <a:t>baza</a:t>
             </a:r>
             <a:r>
-              <a:rPr lang="en-US" sz="2000" dirty="0" smtClean="0"/>
-              <a:t> </a:t>
-            </a:r>
-            <a:r>
-              <a:rPr lang="en-US" sz="2000" dirty="0" err="1" smtClean="0"/>
+              <a:rPr lang="en-US" sz="2000" dirty="0"/>
+              <a:t> </a:t>
+            </a:r>
+            <a:r>
+              <a:rPr lang="en-US" sz="2000" dirty="0" err="1"/>
               <a:t>coeficientilor</a:t>
             </a:r>
             <a:r>
-              <a:rPr lang="en-US" sz="2000" dirty="0" smtClean="0"/>
+              <a:rPr lang="en-US" sz="2000" dirty="0"/>
               <a:t> de </a:t>
             </a:r>
             <a:r>
-              <a:rPr lang="en-US" sz="2000" dirty="0" err="1" smtClean="0"/>
+              <a:rPr lang="en-US" sz="2000" dirty="0" err="1"/>
               <a:t>corelatie</a:t>
             </a:r>
-            <a:r>
-              <a:rPr lang="en-US" dirty="0" smtClean="0"/>
-              <a:t/>
-            </a:r>
             <a:br>
-              <a:rPr lang="en-US" dirty="0" smtClean="0"/>
+              <a:rPr lang="en-US" dirty="0"/>
             </a:br>
             <a:endParaRPr lang="en-US" dirty="0"/>
           </a:p>
@@ -8445,7 +8859,7 @@
     </p:spTree>
     <p:extLst>
       <p:ext uri="{BB962C8B-B14F-4D97-AF65-F5344CB8AC3E}">
-        <p14:creationId xmlns="" xmlns:p14="http://schemas.microsoft.com/office/powerpoint/2010/main" val="3556938042"/>
+        <p14:creationId xmlns:p14="http://schemas.microsoft.com/office/powerpoint/2010/main" val="3556938042"/>
       </p:ext>
     </p:extLst>
   </p:cSld>
@@ -8477,7 +8891,7 @@
           <p:cNvPr id="2" name="Title 1">
             <a:extLst>
               <a:ext uri="{FF2B5EF4-FFF2-40B4-BE49-F238E27FC236}">
-                <a16:creationId xmlns="" xmlns:a16="http://schemas.microsoft.com/office/drawing/2014/main" id="{1C28F45A-B42E-45E7-BA7D-14B7093D2226}"/>
+                <a16:creationId xmlns:a16="http://schemas.microsoft.com/office/drawing/2014/main" id="{1C28F45A-B42E-45E7-BA7D-14B7093D2226}"/>
               </a:ext>
             </a:extLst>
           </p:cNvPr>
@@ -8533,7 +8947,7 @@
           <p:cNvPr id="5" name="Content Placeholder 4" descr="Graphical user interface, text, application&#10;&#10;Description automatically generated">
             <a:extLst>
               <a:ext uri="{FF2B5EF4-FFF2-40B4-BE49-F238E27FC236}">
-                <a16:creationId xmlns="" xmlns:a16="http://schemas.microsoft.com/office/drawing/2014/main" id="{DD8C13EE-AD80-4051-8D7D-75812A241D5F}"/>
+                <a16:creationId xmlns:a16="http://schemas.microsoft.com/office/drawing/2014/main" id="{DD8C13EE-AD80-4051-8D7D-75812A241D5F}"/>
               </a:ext>
             </a:extLst>
           </p:cNvPr>
@@ -8560,7 +8974,7 @@
     </p:spTree>
     <p:extLst>
       <p:ext uri="{BB962C8B-B14F-4D97-AF65-F5344CB8AC3E}">
-        <p14:creationId xmlns="" xmlns:p14="http://schemas.microsoft.com/office/powerpoint/2010/main" val="1215889596"/>
+        <p14:creationId xmlns:p14="http://schemas.microsoft.com/office/powerpoint/2010/main" val="1215889596"/>
       </p:ext>
     </p:extLst>
   </p:cSld>
@@ -8592,7 +9006,7 @@
           <p:cNvPr id="2" name="Title 1">
             <a:extLst>
               <a:ext uri="{FF2B5EF4-FFF2-40B4-BE49-F238E27FC236}">
-                <a16:creationId xmlns="" xmlns:a16="http://schemas.microsoft.com/office/drawing/2014/main" id="{4C430948-8D72-406B-B7F9-4A09368DF1B1}"/>
+                <a16:creationId xmlns:a16="http://schemas.microsoft.com/office/drawing/2014/main" id="{4C430948-8D72-406B-B7F9-4A09368DF1B1}"/>
               </a:ext>
             </a:extLst>
           </p:cNvPr>
@@ -8620,7 +9034,7 @@
           <p:cNvPr id="3" name="Content Placeholder 2">
             <a:extLst>
               <a:ext uri="{FF2B5EF4-FFF2-40B4-BE49-F238E27FC236}">
-                <a16:creationId xmlns="" xmlns:a16="http://schemas.microsoft.com/office/drawing/2014/main" id="{24C33791-778D-48C2-AEDA-84280D481425}"/>
+                <a16:creationId xmlns:a16="http://schemas.microsoft.com/office/drawing/2014/main" id="{24C33791-778D-48C2-AEDA-84280D481425}"/>
               </a:ext>
             </a:extLst>
           </p:cNvPr>
@@ -9827,7 +10241,7 @@
     </p:spTree>
     <p:extLst>
       <p:ext uri="{BB962C8B-B14F-4D97-AF65-F5344CB8AC3E}">
-        <p14:creationId xmlns="" xmlns:p14="http://schemas.microsoft.com/office/powerpoint/2010/main" val="1572576420"/>
+        <p14:creationId xmlns:p14="http://schemas.microsoft.com/office/powerpoint/2010/main" val="1572576420"/>
       </p:ext>
     </p:extLst>
   </p:cSld>
@@ -10107,7 +10521,7 @@
   <a:extraClrSchemeLst/>
   <a:extLst>
     <a:ext uri="{05A4C25C-085E-4340-85A3-A5531E510DB2}">
-      <thm15:themeFamily xmlns="" xmlns:thm15="http://schemas.microsoft.com/office/thememl/2012/main" name="SavonVTI" id="{A72E8C35-66DD-49F8-AF66-813F19B983AE}" vid="{93CCBC76-B7A1-4C3D-93EA-5CE34C4670F9}"/>
+      <thm15:themeFamily xmlns:thm15="http://schemas.microsoft.com/office/thememl/2012/main" name="SavonVTI" id="{A72E8C35-66DD-49F8-AF66-813F19B983AE}" vid="{93CCBC76-B7A1-4C3D-93EA-5CE34C4670F9}"/>
     </a:ext>
   </a:extLst>
 </a:theme>
@@ -10157,24 +10571,6 @@
 </file>
 
 <file path=customXml/item1.xml><?xml version="1.0" encoding="utf-8"?>
-<?mso-contentType ?>
-<FormTemplates xmlns="http://schemas.microsoft.com/sharepoint/v3/contenttype/forms">
-  <Display>DocumentLibraryForm</Display>
-  <Edit>DocumentLibraryForm</Edit>
-  <New>DocumentLibraryForm</New>
-</FormTemplates>
-</file>
-
-<file path=customXml/item2.xml><?xml version="1.0" encoding="utf-8"?>
-<p:properties xmlns:p="http://schemas.microsoft.com/office/2006/metadata/properties" xmlns:xsi="http://www.w3.org/2001/XMLSchema-instance" xmlns:pc="http://schemas.microsoft.com/office/infopath/2007/PartnerControls">
-  <documentManagement>
-    <Status xmlns="71af3243-3dd4-4a8d-8c0d-dd76da1f02a5">Not started</Status>
-    <MediaServiceKeyPoints xmlns="71af3243-3dd4-4a8d-8c0d-dd76da1f02a5" xsi:nil="true"/>
-  </documentManagement>
-</p:properties>
-</file>
-
-<file path=customXml/item3.xml><?xml version="1.0" encoding="utf-8"?>
 <ct:contentTypeSchema xmlns:ct="http://schemas.microsoft.com/office/2006/metadata/contentType" xmlns:ma="http://schemas.microsoft.com/office/2006/metadata/properties/metaAttributes" ct:_="" ma:_="" ma:contentTypeName="Document" ma:contentTypeID="0x01010079F111ED35F8CC479449609E8A0923A6" ma:contentTypeVersion="12" ma:contentTypeDescription="Create a new document." ma:contentTypeScope="" ma:versionID="a410dd7f93c95333ffa1b60ed6adedd1">
   <xsd:schema xmlns:xsd="http://www.w3.org/2001/XMLSchema" xmlns:xs="http://www.w3.org/2001/XMLSchema" xmlns:p="http://schemas.microsoft.com/office/2006/metadata/properties" xmlns:ns2="71af3243-3dd4-4a8d-8c0d-dd76da1f02a5" xmlns:ns3="16c05727-aa75-4e4a-9b5f-8a80a1165891" targetNamespace="http://schemas.microsoft.com/office/2006/metadata/properties" ma:root="true" ma:fieldsID="a936d9baba76aa3866493feff160faab" ns2:_="" ns3:_="">
     <xsd:import namespace="71af3243-3dd4-4a8d-8c0d-dd76da1f02a5"/>
@@ -10395,25 +10791,25 @@
 </ct:contentTypeSchema>
 </file>
 
-<file path=customXml/itemProps1.xml><?xml version="1.0" encoding="utf-8"?>
-<ds:datastoreItem xmlns:ds="http://schemas.openxmlformats.org/officeDocument/2006/customXml" ds:itemID="{AE2713E1-6312-427E-BFCB-C5A5DA301373}">
-  <ds:schemaRefs>
-    <ds:schemaRef ds:uri="http://schemas.microsoft.com/sharepoint/v3/contenttype/forms"/>
-  </ds:schemaRefs>
-</ds:datastoreItem>
+<file path=customXml/item2.xml><?xml version="1.0" encoding="utf-8"?>
+<p:properties xmlns:p="http://schemas.microsoft.com/office/2006/metadata/properties" xmlns:xsi="http://www.w3.org/2001/XMLSchema-instance" xmlns:pc="http://schemas.microsoft.com/office/infopath/2007/PartnerControls">
+  <documentManagement>
+    <Status xmlns="71af3243-3dd4-4a8d-8c0d-dd76da1f02a5">Not started</Status>
+    <MediaServiceKeyPoints xmlns="71af3243-3dd4-4a8d-8c0d-dd76da1f02a5" xsi:nil="true"/>
+  </documentManagement>
+</p:properties>
 </file>
 
-<file path=customXml/itemProps2.xml><?xml version="1.0" encoding="utf-8"?>
-<ds:datastoreItem xmlns:ds="http://schemas.openxmlformats.org/officeDocument/2006/customXml" ds:itemID="{52F3B215-496E-4790-A364-7C1C46DEC771}">
-  <ds:schemaRefs>
-    <ds:schemaRef ds:uri="http://schemas.microsoft.com/office/2006/metadata/properties"/>
-    <ds:schemaRef ds:uri="http://schemas.microsoft.com/office/infopath/2007/PartnerControls"/>
-    <ds:schemaRef ds:uri="71af3243-3dd4-4a8d-8c0d-dd76da1f02a5"/>
-  </ds:schemaRefs>
-</ds:datastoreItem>
+<file path=customXml/item3.xml><?xml version="1.0" encoding="utf-8"?>
+<?mso-contentType ?>
+<FormTemplates xmlns="http://schemas.microsoft.com/sharepoint/v3/contenttype/forms">
+  <Display>DocumentLibraryForm</Display>
+  <Edit>DocumentLibraryForm</Edit>
+  <New>DocumentLibraryForm</New>
+</FormTemplates>
 </file>
 
-<file path=customXml/itemProps3.xml><?xml version="1.0" encoding="utf-8"?>
+<file path=customXml/itemProps1.xml><?xml version="1.0" encoding="utf-8"?>
 <ds:datastoreItem xmlns:ds="http://schemas.openxmlformats.org/officeDocument/2006/customXml" ds:itemID="{50DB95DD-0319-4EE5-8C5C-9CEDF75E024B}">
   <ds:schemaRefs>
     <ds:schemaRef ds:uri="http://schemas.microsoft.com/office/2006/metadata/contentType"/>
@@ -10430,4 +10826,22 @@
     <ds:schemaRef ds:uri="http://schemas.microsoft.com/internal/obd"/>
   </ds:schemaRefs>
 </ds:datastoreItem>
+</file>
+
+<file path=customXml/itemProps2.xml><?xml version="1.0" encoding="utf-8"?>
+<ds:datastoreItem xmlns:ds="http://schemas.openxmlformats.org/officeDocument/2006/customXml" ds:itemID="{52F3B215-496E-4790-A364-7C1C46DEC771}">
+  <ds:schemaRefs>
+    <ds:schemaRef ds:uri="http://schemas.microsoft.com/office/2006/metadata/properties"/>
+    <ds:schemaRef ds:uri="http://schemas.microsoft.com/office/infopath/2007/PartnerControls"/>
+    <ds:schemaRef ds:uri="71af3243-3dd4-4a8d-8c0d-dd76da1f02a5"/>
+  </ds:schemaRefs>
+</ds:datastoreItem>
+</file>
+
+<file path=customXml/itemProps3.xml><?xml version="1.0" encoding="utf-8"?>
+<ds:datastoreItem xmlns:ds="http://schemas.openxmlformats.org/officeDocument/2006/customXml" ds:itemID="{AE2713E1-6312-427E-BFCB-C5A5DA301373}">
+  <ds:schemaRefs>
+    <ds:schemaRef ds:uri="http://schemas.microsoft.com/sharepoint/v3/contenttype/forms"/>
+  </ds:schemaRefs>
+</ds:datastoreItem>
 </file>
</xml_diff>